<commit_message>
lecture 2 slides upload
</commit_message>
<xml_diff>
--- a/lecture slides/Chapter 1 - Introduction.pptx
+++ b/lecture slides/Chapter 1 - Introduction.pptx
@@ -289,7 +289,7 @@
             <a:fld id="{CB44B6B1-5441-9644-AE1C-BB7EA5DBA264}" type="datetimeFigureOut">
               <a:rPr lang="en-US" smtClean="0"/>
               <a:pPr/>
-              <a:t>9/19/2018</a:t>
+              <a:t>10/18/2020</a:t>
             </a:fld>
             <a:endParaRPr lang="en-US"/>
           </a:p>
@@ -452,7 +452,7 @@
             <a:fld id="{41878819-472C-A14B-95BF-39C94BA106B2}" type="datetimeFigureOut">
               <a:rPr lang="en-US" smtClean="0"/>
               <a:pPr/>
-              <a:t>9/19/2018</a:t>
+              <a:t>10/18/2020</a:t>
             </a:fld>
             <a:endParaRPr lang="en-US"/>
           </a:p>
@@ -1988,7 +1988,7 @@
               <a:pPr>
                 <a:defRPr/>
               </a:pPr>
-              <a:t>9/19/2018</a:t>
+              <a:t>10/18/2020</a:t>
             </a:fld>
             <a:endParaRPr lang="en-US"/>
           </a:p>
@@ -2192,7 +2192,7 @@
               <a:pPr>
                 <a:defRPr/>
               </a:pPr>
-              <a:t>9/19/2018</a:t>
+              <a:t>10/18/2020</a:t>
             </a:fld>
             <a:endParaRPr lang="en-US"/>
           </a:p>
@@ -2401,7 +2401,7 @@
               <a:pPr>
                 <a:defRPr/>
               </a:pPr>
-              <a:t>9/19/2018</a:t>
+              <a:t>10/18/2020</a:t>
             </a:fld>
             <a:endParaRPr lang="en-US"/>
           </a:p>
@@ -2667,7 +2667,7 @@
               <a:pPr>
                 <a:defRPr/>
               </a:pPr>
-              <a:t>9/19/2018</a:t>
+              <a:t>10/18/2020</a:t>
             </a:fld>
             <a:endParaRPr lang="en-US"/>
           </a:p>
@@ -2942,7 +2942,7 @@
               <a:pPr>
                 <a:defRPr/>
               </a:pPr>
-              <a:t>9/19/2018</a:t>
+              <a:t>10/18/2020</a:t>
             </a:fld>
             <a:endParaRPr lang="en-US"/>
           </a:p>
@@ -3262,7 +3262,7 @@
               <a:pPr>
                 <a:defRPr/>
               </a:pPr>
-              <a:t>9/19/2018</a:t>
+              <a:t>10/18/2020</a:t>
             </a:fld>
             <a:endParaRPr lang="en-US"/>
           </a:p>
@@ -3722,7 +3722,7 @@
               <a:pPr>
                 <a:defRPr/>
               </a:pPr>
-              <a:t>9/19/2018</a:t>
+              <a:t>10/18/2020</a:t>
             </a:fld>
             <a:endParaRPr lang="en-US"/>
           </a:p>
@@ -3866,7 +3866,7 @@
               <a:pPr>
                 <a:defRPr/>
               </a:pPr>
-              <a:t>9/19/2018</a:t>
+              <a:t>10/18/2020</a:t>
             </a:fld>
             <a:endParaRPr lang="en-US"/>
           </a:p>
@@ -3987,7 +3987,7 @@
               <a:pPr>
                 <a:defRPr/>
               </a:pPr>
-              <a:t>9/19/2018</a:t>
+              <a:t>10/18/2020</a:t>
             </a:fld>
             <a:endParaRPr lang="en-US"/>
           </a:p>
@@ -4296,7 +4296,7 @@
               <a:pPr>
                 <a:defRPr/>
               </a:pPr>
-              <a:t>9/19/2018</a:t>
+              <a:t>10/18/2020</a:t>
             </a:fld>
             <a:endParaRPr lang="en-US"/>
           </a:p>
@@ -4586,7 +4586,7 @@
               <a:pPr>
                 <a:defRPr/>
               </a:pPr>
-              <a:t>9/19/2018</a:t>
+              <a:t>10/18/2020</a:t>
             </a:fld>
             <a:endParaRPr lang="en-US"/>
           </a:p>
@@ -4778,7 +4778,7 @@
               <a:pPr>
                 <a:defRPr/>
               </a:pPr>
-              <a:t>9/19/2018</a:t>
+              <a:t>10/18/2020</a:t>
             </a:fld>
             <a:endParaRPr lang="en-US"/>
           </a:p>
@@ -5466,7 +5466,11 @@
             <a:pPr eaLnBrk="1" hangingPunct="1"/>
             <a:r>
               <a:rPr lang="en-US" dirty="0" smtClean="0"/>
-              <a:t>Chapter 1- Introduction</a:t>
+              <a:t>Lecture </a:t>
+            </a:r>
+            <a:r>
+              <a:rPr lang="en-US" dirty="0" smtClean="0"/>
+              <a:t>1- Introduction</a:t>
             </a:r>
           </a:p>
         </p:txBody>
@@ -5499,7 +5503,14 @@
                 <a:ea typeface="+mn-ea"/>
                 <a:cs typeface="+mn-cs"/>
               </a:rPr>
-              <a:t>Lecture 1</a:t>
+              <a:t>Part </a:t>
+            </a:r>
+            <a:r>
+              <a:rPr lang="en-US" dirty="0" smtClean="0">
+                <a:ea typeface="+mn-ea"/>
+                <a:cs typeface="+mn-cs"/>
+              </a:rPr>
+              <a:t>1</a:t>
             </a:r>
             <a:endParaRPr lang="en-US" dirty="0">
               <a:ea typeface="+mn-ea"/>
@@ -7830,8 +7841,12 @@
           <a:p>
             <a:pPr eaLnBrk="1" hangingPunct="1"/>
             <a:r>
+              <a:rPr lang="en-US" smtClean="0"/>
+              <a:t>Lecture </a:t>
+            </a:r>
+            <a:r>
               <a:rPr lang="en-US" dirty="0" smtClean="0"/>
-              <a:t>Chapter 1- Introduction</a:t>
+              <a:t>1- Introduction</a:t>
             </a:r>
           </a:p>
         </p:txBody>
@@ -7864,7 +7879,14 @@
                 <a:ea typeface="+mn-ea"/>
                 <a:cs typeface="+mn-cs"/>
               </a:rPr>
-              <a:t>Lecture 2</a:t>
+              <a:t>Part </a:t>
+            </a:r>
+            <a:r>
+              <a:rPr lang="en-US" dirty="0" smtClean="0">
+                <a:ea typeface="+mn-ea"/>
+                <a:cs typeface="+mn-cs"/>
+              </a:rPr>
+              <a:t>2</a:t>
             </a:r>
             <a:endParaRPr lang="en-US" dirty="0">
               <a:ea typeface="+mn-ea"/>
@@ -9519,7 +9541,7 @@
           <p:nvPr/>
         </p:nvPicPr>
         <mc:AlternateContent xmlns:mc="http://schemas.openxmlformats.org/markup-compatibility/2006">
-          <mc:Choice xmlns="" xmlns:mv="urn:schemas-microsoft-com:mac:vml" xmlns:ma="http://schemas.microsoft.com/office/mac/drawingml/2008/main" Requires="ma">
+          <mc:Choice xmlns:ma="http://schemas.microsoft.com/office/mac/drawingml/2008/main" xmlns:mv="urn:schemas-microsoft-com:mac:vml" xmlns="" Requires="ma">
             <p:blipFill>
               <a:blip r:embed="rId2"/>
               <a:stretch>
@@ -9690,7 +9712,7 @@
           <p:nvPr/>
         </p:nvPicPr>
         <mc:AlternateContent xmlns:mc="http://schemas.openxmlformats.org/markup-compatibility/2006">
-          <mc:Choice xmlns="" xmlns:mv="urn:schemas-microsoft-com:mac:vml" xmlns:ma="http://schemas.microsoft.com/office/mac/drawingml/2008/main" Requires="ma">
+          <mc:Choice xmlns:ma="http://schemas.microsoft.com/office/mac/drawingml/2008/main" xmlns:mv="urn:schemas-microsoft-com:mac:vml" xmlns="" Requires="ma">
             <p:blipFill>
               <a:blip r:embed="rId2"/>
               <a:stretch>
@@ -10502,7 +10524,7 @@
           <p:nvPr/>
         </p:nvPicPr>
         <mc:AlternateContent xmlns:mc="http://schemas.openxmlformats.org/markup-compatibility/2006">
-          <mc:Choice xmlns="" xmlns:mv="urn:schemas-microsoft-com:mac:vml" xmlns:ma="http://schemas.microsoft.com/office/mac/drawingml/2008/main" Requires="ma">
+          <mc:Choice xmlns:ma="http://schemas.microsoft.com/office/mac/drawingml/2008/main" xmlns:mv="urn:schemas-microsoft-com:mac:vml" xmlns="" Requires="ma">
             <p:blipFill>
               <a:blip r:embed="rId2"/>
               <a:stretch>
@@ -11138,7 +11160,7 @@
           <p:nvPr/>
         </p:nvPicPr>
         <mc:AlternateContent xmlns:mc="http://schemas.openxmlformats.org/markup-compatibility/2006">
-          <mc:Choice xmlns="" xmlns:mv="urn:schemas-microsoft-com:mac:vml" xmlns:ma="http://schemas.microsoft.com/office/mac/drawingml/2008/main" Requires="ma">
+          <mc:Choice xmlns:ma="http://schemas.microsoft.com/office/mac/drawingml/2008/main" xmlns:mv="urn:schemas-microsoft-com:mac:vml" xmlns="" Requires="ma">
             <p:blipFill>
               <a:blip r:embed="rId2"/>
               <a:stretch>

</xml_diff>

<commit_message>
lecture 3 slides upload
</commit_message>
<xml_diff>
--- a/lecture slides/Chapter 1 - Introduction.pptx
+++ b/lecture slides/Chapter 1 - Introduction.pptx
@@ -289,7 +289,7 @@
             <a:fld id="{CB44B6B1-5441-9644-AE1C-BB7EA5DBA264}" type="datetimeFigureOut">
               <a:rPr lang="en-US" smtClean="0"/>
               <a:pPr/>
-              <a:t>10/18/2020</a:t>
+              <a:t>10/22/2020</a:t>
             </a:fld>
             <a:endParaRPr lang="en-US"/>
           </a:p>
@@ -452,7 +452,7 @@
             <a:fld id="{41878819-472C-A14B-95BF-39C94BA106B2}" type="datetimeFigureOut">
               <a:rPr lang="en-US" smtClean="0"/>
               <a:pPr/>
-              <a:t>10/18/2020</a:t>
+              <a:t>10/22/2020</a:t>
             </a:fld>
             <a:endParaRPr lang="en-US"/>
           </a:p>
@@ -1988,7 +1988,7 @@
               <a:pPr>
                 <a:defRPr/>
               </a:pPr>
-              <a:t>10/18/2020</a:t>
+              <a:t>10/22/2020</a:t>
             </a:fld>
             <a:endParaRPr lang="en-US"/>
           </a:p>
@@ -2017,10 +2017,10 @@
               <a:defRPr/>
             </a:pPr>
             <a:r>
-              <a:rPr lang="en-US" smtClean="0"/>
-              <a:t>Chapter 1  Introduction</a:t>
-            </a:r>
-            <a:endParaRPr lang="en-US"/>
+              <a:rPr lang="en-US" dirty="0" smtClean="0"/>
+              <a:t>Lecture 1  Introduction</a:t>
+            </a:r>
+            <a:endParaRPr lang="en-US" dirty="0"/>
           </a:p>
         </p:txBody>
       </p:sp>
@@ -2192,7 +2192,7 @@
               <a:pPr>
                 <a:defRPr/>
               </a:pPr>
-              <a:t>10/18/2020</a:t>
+              <a:t>10/22/2020</a:t>
             </a:fld>
             <a:endParaRPr lang="en-US"/>
           </a:p>
@@ -2221,10 +2221,10 @@
               <a:defRPr/>
             </a:pPr>
             <a:r>
-              <a:rPr lang="en-US" smtClean="0"/>
-              <a:t>Chapter 1  Introduction</a:t>
-            </a:r>
-            <a:endParaRPr lang="en-US"/>
+              <a:rPr lang="en-US" dirty="0" smtClean="0"/>
+              <a:t>Lecture 1  Introduction</a:t>
+            </a:r>
+            <a:endParaRPr lang="en-US" dirty="0"/>
           </a:p>
         </p:txBody>
       </p:sp>
@@ -2401,7 +2401,7 @@
               <a:pPr>
                 <a:defRPr/>
               </a:pPr>
-              <a:t>10/18/2020</a:t>
+              <a:t>10/22/2020</a:t>
             </a:fld>
             <a:endParaRPr lang="en-US"/>
           </a:p>
@@ -2430,10 +2430,10 @@
               <a:defRPr/>
             </a:pPr>
             <a:r>
-              <a:rPr lang="en-US" smtClean="0"/>
-              <a:t>Chapter 1  Introduction</a:t>
-            </a:r>
-            <a:endParaRPr lang="en-US"/>
+              <a:rPr lang="en-US" dirty="0" smtClean="0"/>
+              <a:t>Lecture 1  Introduction</a:t>
+            </a:r>
+            <a:endParaRPr lang="en-US" dirty="0"/>
           </a:p>
         </p:txBody>
       </p:sp>
@@ -2667,7 +2667,7 @@
               <a:pPr>
                 <a:defRPr/>
               </a:pPr>
-              <a:t>10/18/2020</a:t>
+              <a:t>10/22/2020</a:t>
             </a:fld>
             <a:endParaRPr lang="en-US"/>
           </a:p>
@@ -2696,10 +2696,10 @@
               <a:defRPr/>
             </a:pPr>
             <a:r>
-              <a:rPr lang="en-US" smtClean="0"/>
-              <a:t>Chapter 1  Introduction</a:t>
-            </a:r>
-            <a:endParaRPr lang="en-US"/>
+              <a:rPr lang="en-US" dirty="0" smtClean="0"/>
+              <a:t>Lecture 1  Introduction</a:t>
+            </a:r>
+            <a:endParaRPr lang="en-US" dirty="0"/>
           </a:p>
         </p:txBody>
       </p:sp>
@@ -2942,7 +2942,7 @@
               <a:pPr>
                 <a:defRPr/>
               </a:pPr>
-              <a:t>10/18/2020</a:t>
+              <a:t>10/22/2020</a:t>
             </a:fld>
             <a:endParaRPr lang="en-US"/>
           </a:p>
@@ -2971,10 +2971,10 @@
               <a:defRPr/>
             </a:pPr>
             <a:r>
-              <a:rPr lang="en-US" smtClean="0"/>
-              <a:t>Chapter 1  Introduction</a:t>
-            </a:r>
-            <a:endParaRPr lang="en-US"/>
+              <a:rPr lang="en-US" dirty="0" smtClean="0"/>
+              <a:t>Lecture 1  Introduction</a:t>
+            </a:r>
+            <a:endParaRPr lang="en-US" dirty="0"/>
           </a:p>
         </p:txBody>
       </p:sp>
@@ -3262,7 +3262,7 @@
               <a:pPr>
                 <a:defRPr/>
               </a:pPr>
-              <a:t>10/18/2020</a:t>
+              <a:t>10/22/2020</a:t>
             </a:fld>
             <a:endParaRPr lang="en-US"/>
           </a:p>
@@ -3291,10 +3291,10 @@
               <a:defRPr/>
             </a:pPr>
             <a:r>
-              <a:rPr lang="en-US" smtClean="0"/>
-              <a:t>Chapter 1  Introduction</a:t>
-            </a:r>
-            <a:endParaRPr lang="en-US"/>
+              <a:rPr lang="en-US" dirty="0" smtClean="0"/>
+              <a:t>Lecture 1  Introduction</a:t>
+            </a:r>
+            <a:endParaRPr lang="en-US" dirty="0"/>
           </a:p>
         </p:txBody>
       </p:sp>
@@ -3722,7 +3722,7 @@
               <a:pPr>
                 <a:defRPr/>
               </a:pPr>
-              <a:t>10/18/2020</a:t>
+              <a:t>10/22/2020</a:t>
             </a:fld>
             <a:endParaRPr lang="en-US"/>
           </a:p>
@@ -3751,10 +3751,10 @@
               <a:defRPr/>
             </a:pPr>
             <a:r>
-              <a:rPr lang="en-US" smtClean="0"/>
-              <a:t>Chapter 1  Introduction</a:t>
-            </a:r>
-            <a:endParaRPr lang="en-US"/>
+              <a:rPr lang="en-US" dirty="0" smtClean="0"/>
+              <a:t>Lecture 1  Introduction</a:t>
+            </a:r>
+            <a:endParaRPr lang="en-US" dirty="0"/>
           </a:p>
         </p:txBody>
       </p:sp>
@@ -3866,7 +3866,7 @@
               <a:pPr>
                 <a:defRPr/>
               </a:pPr>
-              <a:t>10/18/2020</a:t>
+              <a:t>10/22/2020</a:t>
             </a:fld>
             <a:endParaRPr lang="en-US"/>
           </a:p>
@@ -3895,10 +3895,10 @@
               <a:defRPr/>
             </a:pPr>
             <a:r>
-              <a:rPr lang="en-US" smtClean="0"/>
-              <a:t>Chapter 1  Introduction</a:t>
-            </a:r>
-            <a:endParaRPr lang="en-US"/>
+              <a:rPr lang="en-US" dirty="0" smtClean="0"/>
+              <a:t>Lecture 1  Introduction</a:t>
+            </a:r>
+            <a:endParaRPr lang="en-US" dirty="0"/>
           </a:p>
         </p:txBody>
       </p:sp>
@@ -3987,7 +3987,7 @@
               <a:pPr>
                 <a:defRPr/>
               </a:pPr>
-              <a:t>10/18/2020</a:t>
+              <a:t>10/22/2020</a:t>
             </a:fld>
             <a:endParaRPr lang="en-US"/>
           </a:p>
@@ -4016,10 +4016,10 @@
               <a:defRPr/>
             </a:pPr>
             <a:r>
-              <a:rPr lang="en-US" smtClean="0"/>
-              <a:t>Chapter 1  Introduction</a:t>
-            </a:r>
-            <a:endParaRPr lang="en-US"/>
+              <a:rPr lang="en-US" dirty="0" smtClean="0"/>
+              <a:t>Lecture 1  Introduction</a:t>
+            </a:r>
+            <a:endParaRPr lang="en-US" dirty="0"/>
           </a:p>
         </p:txBody>
       </p:sp>
@@ -4296,7 +4296,7 @@
               <a:pPr>
                 <a:defRPr/>
               </a:pPr>
-              <a:t>10/18/2020</a:t>
+              <a:t>10/22/2020</a:t>
             </a:fld>
             <a:endParaRPr lang="en-US"/>
           </a:p>
@@ -4325,10 +4325,10 @@
               <a:defRPr/>
             </a:pPr>
             <a:r>
-              <a:rPr lang="en-US" smtClean="0"/>
-              <a:t>Chapter 1  Introduction</a:t>
-            </a:r>
-            <a:endParaRPr lang="en-US"/>
+              <a:rPr lang="en-US" dirty="0" smtClean="0"/>
+              <a:t>Lecture 1  Introduction</a:t>
+            </a:r>
+            <a:endParaRPr lang="en-US" dirty="0"/>
           </a:p>
         </p:txBody>
       </p:sp>
@@ -4586,7 +4586,7 @@
               <a:pPr>
                 <a:defRPr/>
               </a:pPr>
-              <a:t>10/18/2020</a:t>
+              <a:t>10/22/2020</a:t>
             </a:fld>
             <a:endParaRPr lang="en-US"/>
           </a:p>
@@ -4615,10 +4615,10 @@
               <a:defRPr/>
             </a:pPr>
             <a:r>
-              <a:rPr lang="en-US" smtClean="0"/>
-              <a:t>Chapter 1  Introduction</a:t>
-            </a:r>
-            <a:endParaRPr lang="en-US"/>
+              <a:rPr lang="en-US" dirty="0" smtClean="0"/>
+              <a:t>Lecture 1  Introduction</a:t>
+            </a:r>
+            <a:endParaRPr lang="en-US" dirty="0"/>
           </a:p>
         </p:txBody>
       </p:sp>
@@ -4778,7 +4778,7 @@
               <a:pPr>
                 <a:defRPr/>
               </a:pPr>
-              <a:t>10/18/2020</a:t>
+              <a:t>10/22/2020</a:t>
             </a:fld>
             <a:endParaRPr lang="en-US"/>
           </a:p>
@@ -4830,10 +4830,9 @@
               <a:defRPr/>
             </a:pPr>
             <a:r>
-              <a:rPr lang="en-US" smtClean="0"/>
-              <a:t>Chapter 1  Introduction</a:t>
-            </a:r>
-            <a:endParaRPr lang="en-US" dirty="0" smtClean="0"/>
+              <a:rPr lang="en-US" dirty="0" smtClean="0"/>
+              <a:t>Lecture 1  Introduction</a:t>
+            </a:r>
           </a:p>
         </p:txBody>
       </p:sp>
@@ -5466,11 +5465,7 @@
             <a:pPr eaLnBrk="1" hangingPunct="1"/>
             <a:r>
               <a:rPr lang="en-US" dirty="0" smtClean="0"/>
-              <a:t>Lecture </a:t>
-            </a:r>
-            <a:r>
-              <a:rPr lang="en-US" dirty="0" smtClean="0"/>
-              <a:t>1- Introduction</a:t>
+              <a:t>Lecture 1- Introduction</a:t>
             </a:r>
           </a:p>
         </p:txBody>
@@ -5503,14 +5498,7 @@
                 <a:ea typeface="+mn-ea"/>
                 <a:cs typeface="+mn-cs"/>
               </a:rPr>
-              <a:t>Part </a:t>
-            </a:r>
-            <a:r>
-              <a:rPr lang="en-US" dirty="0" smtClean="0">
-                <a:ea typeface="+mn-ea"/>
-                <a:cs typeface="+mn-cs"/>
-              </a:rPr>
-              <a:t>1</a:t>
+              <a:t>Part 1</a:t>
             </a:r>
             <a:endParaRPr lang="en-US" dirty="0">
               <a:ea typeface="+mn-ea"/>
@@ -5535,7 +5523,7 @@
         </p:blipFill>
         <p:spPr>
           <a:xfrm>
-            <a:off x="1597755" y="4762500"/>
+            <a:off x="1597755" y="4408538"/>
             <a:ext cx="5948490" cy="1885314"/>
           </a:xfrm>
           <a:prstGeom prst="rect">
@@ -5543,6 +5531,42 @@
           </a:prstGeom>
         </p:spPr>
       </p:pic>
+      <p:sp>
+        <p:nvSpPr>
+          <p:cNvPr id="6" name="Metin kutusu 5"/>
+          <p:cNvSpPr txBox="1"/>
+          <p:nvPr/>
+        </p:nvSpPr>
+        <p:spPr>
+          <a:xfrm>
+            <a:off x="0" y="6488668"/>
+            <a:ext cx="8563897" cy="369332"/>
+          </a:xfrm>
+          <a:prstGeom prst="rect">
+            <a:avLst/>
+          </a:prstGeom>
+          <a:noFill/>
+        </p:spPr>
+        <p:txBody>
+          <a:bodyPr wrap="square" rtlCol="0">
+            <a:spAutoFit/>
+          </a:bodyPr>
+          <a:lstStyle/>
+          <a:p>
+            <a:r>
+              <a:rPr lang="en-US" dirty="0"/>
+              <a:t>Source : </a:t>
+            </a:r>
+            <a:r>
+              <a:rPr lang="en-US" dirty="0">
+                <a:hlinkClick r:id="rId3"/>
+              </a:rPr>
+              <a:t>https://ifs.host.cs.st-andrews.ac.uk/Books/SE9/Presentations/index.html </a:t>
+            </a:r>
+            <a:endParaRPr lang="tr-TR" dirty="0"/>
+          </a:p>
+        </p:txBody>
+      </p:sp>
     </p:spTree>
   </p:cSld>
   <p:clrMapOvr>
@@ -5666,10 +5690,10 @@
               <a:defRPr/>
             </a:pPr>
             <a:r>
-              <a:rPr lang="en-US" smtClean="0"/>
-              <a:t>Chapter 1  Introduction</a:t>
-            </a:r>
-            <a:endParaRPr lang="en-US"/>
+              <a:rPr lang="en-US" dirty="0" smtClean="0"/>
+              <a:t>Lecture 1  Introduction</a:t>
+            </a:r>
+            <a:endParaRPr lang="en-US" dirty="0"/>
           </a:p>
         </p:txBody>
       </p:sp>
@@ -5800,10 +5824,10 @@
               <a:defRPr/>
             </a:pPr>
             <a:r>
-              <a:rPr lang="en-US" smtClean="0"/>
-              <a:t>Chapter 1  Introduction</a:t>
-            </a:r>
-            <a:endParaRPr lang="en-US"/>
+              <a:rPr lang="en-US" dirty="0" smtClean="0"/>
+              <a:t>Lecture 1  Introduction</a:t>
+            </a:r>
+            <a:endParaRPr lang="en-US" dirty="0"/>
           </a:p>
         </p:txBody>
       </p:sp>
@@ -5946,10 +5970,10 @@
               <a:defRPr/>
             </a:pPr>
             <a:r>
-              <a:rPr lang="en-US" smtClean="0"/>
-              <a:t>Chapter 1  Introduction</a:t>
-            </a:r>
-            <a:endParaRPr lang="en-US"/>
+              <a:rPr lang="en-US" dirty="0" smtClean="0"/>
+              <a:t>Lecture 1  Introduction</a:t>
+            </a:r>
+            <a:endParaRPr lang="en-US" dirty="0"/>
           </a:p>
         </p:txBody>
       </p:sp>
@@ -6105,10 +6129,10 @@
               <a:defRPr/>
             </a:pPr>
             <a:r>
-              <a:rPr lang="en-US" smtClean="0"/>
-              <a:t>Chapter 1  Introduction</a:t>
-            </a:r>
-            <a:endParaRPr lang="en-US"/>
+              <a:rPr lang="en-US" dirty="0" smtClean="0"/>
+              <a:t>Lecture 1  Introduction</a:t>
+            </a:r>
+            <a:endParaRPr lang="en-US" dirty="0"/>
           </a:p>
         </p:txBody>
       </p:sp>
@@ -6237,10 +6261,10 @@
               <a:defRPr/>
             </a:pPr>
             <a:r>
-              <a:rPr lang="en-US" smtClean="0"/>
-              <a:t>Chapter 1  Introduction</a:t>
-            </a:r>
-            <a:endParaRPr lang="en-US"/>
+              <a:rPr lang="en-US" dirty="0" smtClean="0"/>
+              <a:t>Lecture 1  Introduction</a:t>
+            </a:r>
+            <a:endParaRPr lang="en-US" dirty="0"/>
           </a:p>
         </p:txBody>
       </p:sp>
@@ -6408,10 +6432,10 @@
               <a:defRPr/>
             </a:pPr>
             <a:r>
-              <a:rPr lang="en-US" smtClean="0"/>
-              <a:t>Chapter 1  Introduction</a:t>
-            </a:r>
-            <a:endParaRPr lang="en-US"/>
+              <a:rPr lang="en-US" dirty="0" smtClean="0"/>
+              <a:t>Lecture 1  Introduction</a:t>
+            </a:r>
+            <a:endParaRPr lang="en-US" dirty="0"/>
           </a:p>
         </p:txBody>
       </p:sp>
@@ -6567,10 +6591,10 @@
               <a:defRPr/>
             </a:pPr>
             <a:r>
-              <a:rPr lang="en-US" smtClean="0"/>
-              <a:t>Chapter 1  Introduction</a:t>
-            </a:r>
-            <a:endParaRPr lang="en-US"/>
+              <a:rPr lang="en-US" dirty="0" smtClean="0"/>
+              <a:t>Lecture 1  Introduction</a:t>
+            </a:r>
+            <a:endParaRPr lang="en-US" dirty="0"/>
           </a:p>
         </p:txBody>
       </p:sp>
@@ -6717,10 +6741,10 @@
               <a:defRPr/>
             </a:pPr>
             <a:r>
-              <a:rPr lang="en-US" smtClean="0"/>
-              <a:t>Chapter 1  Introduction</a:t>
-            </a:r>
-            <a:endParaRPr lang="en-US"/>
+              <a:rPr lang="en-US" dirty="0" smtClean="0"/>
+              <a:t>Lecture 1  Introduction</a:t>
+            </a:r>
+            <a:endParaRPr lang="en-US" dirty="0"/>
           </a:p>
         </p:txBody>
       </p:sp>
@@ -6874,10 +6898,10 @@
               <a:defRPr/>
             </a:pPr>
             <a:r>
-              <a:rPr lang="en-US" smtClean="0"/>
-              <a:t>Chapter 1  Introduction</a:t>
-            </a:r>
-            <a:endParaRPr lang="en-US"/>
+              <a:rPr lang="en-US" dirty="0" smtClean="0"/>
+              <a:t>Lecture 1  Introduction</a:t>
+            </a:r>
+            <a:endParaRPr lang="en-US" dirty="0"/>
           </a:p>
         </p:txBody>
       </p:sp>
@@ -6981,7 +7005,7 @@
           <a:p>
             <a:r>
               <a:rPr lang="en-US" dirty="0" smtClean="0"/>
-              <a:t>Web services (discussed in Chapter 19) allow application functionality to be accessed over the web.</a:t>
+              <a:t>Web services (discussed in Lecture 19) allow application functionality to be accessed over the web.</a:t>
             </a:r>
           </a:p>
           <a:p>
@@ -7018,10 +7042,10 @@
               <a:defRPr/>
             </a:pPr>
             <a:r>
-              <a:rPr lang="en-US" smtClean="0"/>
-              <a:t>Chapter 1  Introduction</a:t>
-            </a:r>
-            <a:endParaRPr lang="en-US"/>
+              <a:rPr lang="en-US" dirty="0" smtClean="0"/>
+              <a:t>Lecture 1  Introduction</a:t>
+            </a:r>
+            <a:endParaRPr lang="en-US" dirty="0"/>
           </a:p>
         </p:txBody>
       </p:sp>
@@ -7177,10 +7201,10 @@
               <a:defRPr/>
             </a:pPr>
             <a:r>
-              <a:rPr lang="en-US" smtClean="0"/>
-              <a:t>Chapter 1  Introduction</a:t>
-            </a:r>
-            <a:endParaRPr lang="en-US"/>
+              <a:rPr lang="en-US" dirty="0" smtClean="0"/>
+              <a:t>Lecture 1  Introduction</a:t>
+            </a:r>
+            <a:endParaRPr lang="en-US" dirty="0"/>
           </a:p>
         </p:txBody>
       </p:sp>
@@ -7351,7 +7375,7 @@
             </a:pPr>
             <a:r>
               <a:rPr lang="en-US" dirty="0" smtClean="0"/>
-              <a:t>Chapter 1  Introduction</a:t>
+              <a:t>Lecture 1  Introduction</a:t>
             </a:r>
             <a:endParaRPr lang="en-US" dirty="0"/>
           </a:p>
@@ -7482,10 +7506,10 @@
               <a:defRPr/>
             </a:pPr>
             <a:r>
-              <a:rPr lang="en-US" smtClean="0"/>
-              <a:t>Chapter 1  Introduction</a:t>
-            </a:r>
-            <a:endParaRPr lang="en-US"/>
+              <a:rPr lang="en-US" dirty="0" smtClean="0"/>
+              <a:t>Lecture 1  Introduction</a:t>
+            </a:r>
+            <a:endParaRPr lang="en-US" dirty="0"/>
           </a:p>
         </p:txBody>
       </p:sp>
@@ -7625,10 +7649,10 @@
               <a:defRPr/>
             </a:pPr>
             <a:r>
-              <a:rPr lang="en-US" smtClean="0"/>
-              <a:t>Chapter 1  Introduction</a:t>
-            </a:r>
-            <a:endParaRPr lang="en-US"/>
+              <a:rPr lang="en-US" dirty="0" smtClean="0"/>
+              <a:t>Lecture 1  Introduction</a:t>
+            </a:r>
+            <a:endParaRPr lang="en-US" dirty="0"/>
           </a:p>
         </p:txBody>
       </p:sp>
@@ -7763,10 +7787,10 @@
               <a:defRPr/>
             </a:pPr>
             <a:r>
-              <a:rPr lang="en-US" smtClean="0"/>
-              <a:t>Chapter 1  Introduction</a:t>
-            </a:r>
-            <a:endParaRPr lang="en-US"/>
+              <a:rPr lang="en-US" dirty="0" smtClean="0"/>
+              <a:t>Lecture 1  Introduction</a:t>
+            </a:r>
+            <a:endParaRPr lang="en-US" dirty="0"/>
           </a:p>
         </p:txBody>
       </p:sp>
@@ -7879,14 +7903,7 @@
                 <a:ea typeface="+mn-ea"/>
                 <a:cs typeface="+mn-cs"/>
               </a:rPr>
-              <a:t>Part </a:t>
-            </a:r>
-            <a:r>
-              <a:rPr lang="en-US" dirty="0" smtClean="0">
-                <a:ea typeface="+mn-ea"/>
-                <a:cs typeface="+mn-cs"/>
-              </a:rPr>
-              <a:t>2</a:t>
+              <a:t>Part 2</a:t>
             </a:r>
             <a:endParaRPr lang="en-US" dirty="0">
               <a:ea typeface="+mn-ea"/>
@@ -8434,10 +8451,10 @@
               <a:defRPr/>
             </a:pPr>
             <a:r>
-              <a:rPr lang="en-US" smtClean="0"/>
-              <a:t>Chapter 1  Introduction</a:t>
-            </a:r>
-            <a:endParaRPr lang="en-US"/>
+              <a:rPr lang="en-US" dirty="0" smtClean="0"/>
+              <a:t>Lecture 1  Introduction</a:t>
+            </a:r>
+            <a:endParaRPr lang="en-US" dirty="0"/>
           </a:p>
         </p:txBody>
       </p:sp>
@@ -8662,10 +8679,10 @@
               <a:defRPr/>
             </a:pPr>
             <a:r>
-              <a:rPr lang="en-US" smtClean="0"/>
-              <a:t>Chapter 1  Introduction</a:t>
-            </a:r>
-            <a:endParaRPr lang="en-US"/>
+              <a:rPr lang="en-US" dirty="0" smtClean="0"/>
+              <a:t>Lecture 1  Introduction</a:t>
+            </a:r>
+            <a:endParaRPr lang="en-US" dirty="0"/>
           </a:p>
         </p:txBody>
       </p:sp>
@@ -8863,10 +8880,10 @@
               <a:defRPr/>
             </a:pPr>
             <a:r>
-              <a:rPr lang="en-US" smtClean="0"/>
-              <a:t>Chapter 1  Introduction</a:t>
-            </a:r>
-            <a:endParaRPr lang="en-US"/>
+              <a:rPr lang="en-US" dirty="0" smtClean="0"/>
+              <a:t>Lecture 1  Introduction</a:t>
+            </a:r>
+            <a:endParaRPr lang="en-US" dirty="0"/>
           </a:p>
         </p:txBody>
       </p:sp>
@@ -9248,10 +9265,10 @@
               <a:defRPr/>
             </a:pPr>
             <a:r>
-              <a:rPr lang="en-US" smtClean="0"/>
-              <a:t>Chapter 1  Introduction</a:t>
-            </a:r>
-            <a:endParaRPr lang="en-US"/>
+              <a:rPr lang="en-US" dirty="0" smtClean="0"/>
+              <a:t>Lecture 1  Introduction</a:t>
+            </a:r>
+            <a:endParaRPr lang="en-US" dirty="0"/>
           </a:p>
         </p:txBody>
       </p:sp>
@@ -9392,10 +9409,10 @@
               <a:defRPr/>
             </a:pPr>
             <a:r>
-              <a:rPr lang="en-US" smtClean="0"/>
-              <a:t>Chapter 1  Introduction</a:t>
-            </a:r>
-            <a:endParaRPr lang="en-US"/>
+              <a:rPr lang="en-US" dirty="0" smtClean="0"/>
+              <a:t>Lecture 1  Introduction</a:t>
+            </a:r>
+            <a:endParaRPr lang="en-US" dirty="0"/>
           </a:p>
         </p:txBody>
       </p:sp>
@@ -9496,10 +9513,10 @@
               <a:defRPr/>
             </a:pPr>
             <a:r>
-              <a:rPr lang="en-US" smtClean="0"/>
-              <a:t>Chapter 1  Introduction</a:t>
-            </a:r>
-            <a:endParaRPr lang="en-US"/>
+              <a:rPr lang="en-US" dirty="0" smtClean="0"/>
+              <a:t>Lecture 1  Introduction</a:t>
+            </a:r>
+            <a:endParaRPr lang="en-US" dirty="0"/>
           </a:p>
         </p:txBody>
       </p:sp>
@@ -9667,10 +9684,10 @@
               <a:defRPr/>
             </a:pPr>
             <a:r>
-              <a:rPr lang="en-US" smtClean="0"/>
-              <a:t>Chapter 1  Introduction</a:t>
-            </a:r>
-            <a:endParaRPr lang="en-US"/>
+              <a:rPr lang="en-US" dirty="0" smtClean="0"/>
+              <a:t>Lecture 1  Introduction</a:t>
+            </a:r>
+            <a:endParaRPr lang="en-US" dirty="0"/>
           </a:p>
         </p:txBody>
       </p:sp>
@@ -9872,10 +9889,10 @@
               <a:defRPr/>
             </a:pPr>
             <a:r>
-              <a:rPr lang="en-US" smtClean="0"/>
-              <a:t>Chapter 1  Introduction</a:t>
-            </a:r>
-            <a:endParaRPr lang="en-US"/>
+              <a:rPr lang="en-US" dirty="0" smtClean="0"/>
+              <a:t>Lecture 1  Introduction</a:t>
+            </a:r>
+            <a:endParaRPr lang="en-US" dirty="0"/>
           </a:p>
         </p:txBody>
       </p:sp>
@@ -10017,10 +10034,10 @@
               <a:defRPr/>
             </a:pPr>
             <a:r>
-              <a:rPr lang="en-US" smtClean="0"/>
-              <a:t>Chapter 1  Introduction</a:t>
-            </a:r>
-            <a:endParaRPr lang="en-US"/>
+              <a:rPr lang="en-US" dirty="0" smtClean="0"/>
+              <a:t>Lecture 1  Introduction</a:t>
+            </a:r>
+            <a:endParaRPr lang="en-US" dirty="0"/>
           </a:p>
         </p:txBody>
       </p:sp>
@@ -10155,10 +10172,10 @@
               <a:defRPr/>
             </a:pPr>
             <a:r>
-              <a:rPr lang="en-US" smtClean="0"/>
-              <a:t>Chapter 1  Introduction</a:t>
-            </a:r>
-            <a:endParaRPr lang="en-US"/>
+              <a:rPr lang="en-US" dirty="0" smtClean="0"/>
+              <a:t>Lecture 1  Introduction</a:t>
+            </a:r>
+            <a:endParaRPr lang="en-US" dirty="0"/>
           </a:p>
         </p:txBody>
       </p:sp>
@@ -10375,10 +10392,10 @@
               <a:defRPr/>
             </a:pPr>
             <a:r>
-              <a:rPr lang="en-US" smtClean="0"/>
-              <a:t>Chapter 1  Introduction</a:t>
-            </a:r>
-            <a:endParaRPr lang="en-US"/>
+              <a:rPr lang="en-US" dirty="0" smtClean="0"/>
+              <a:t>Lecture 1  Introduction</a:t>
+            </a:r>
+            <a:endParaRPr lang="en-US" dirty="0"/>
           </a:p>
         </p:txBody>
       </p:sp>
@@ -10479,10 +10496,10 @@
               <a:defRPr/>
             </a:pPr>
             <a:r>
-              <a:rPr lang="en-US" smtClean="0"/>
-              <a:t>Chapter 1  Introduction</a:t>
-            </a:r>
-            <a:endParaRPr lang="en-US"/>
+              <a:rPr lang="en-US" dirty="0" smtClean="0"/>
+              <a:t>Lecture 1  Introduction</a:t>
+            </a:r>
+            <a:endParaRPr lang="en-US" dirty="0"/>
           </a:p>
         </p:txBody>
       </p:sp>
@@ -10710,10 +10727,10 @@
               <a:defRPr/>
             </a:pPr>
             <a:r>
-              <a:rPr lang="en-US" smtClean="0"/>
-              <a:t>Chapter 1  Introduction</a:t>
-            </a:r>
-            <a:endParaRPr lang="en-US"/>
+              <a:rPr lang="en-US" dirty="0" smtClean="0"/>
+              <a:t>Lecture 1  Introduction</a:t>
+            </a:r>
+            <a:endParaRPr lang="en-US" dirty="0"/>
           </a:p>
         </p:txBody>
       </p:sp>
@@ -10864,10 +10881,10 @@
               <a:defRPr/>
             </a:pPr>
             <a:r>
-              <a:rPr lang="en-US" smtClean="0"/>
-              <a:t>Chapter 1  Introduction</a:t>
-            </a:r>
-            <a:endParaRPr lang="en-US"/>
+              <a:rPr lang="en-US" dirty="0" smtClean="0"/>
+              <a:t>Lecture 1  Introduction</a:t>
+            </a:r>
+            <a:endParaRPr lang="en-US" dirty="0"/>
           </a:p>
         </p:txBody>
       </p:sp>
@@ -11011,10 +11028,10 @@
               <a:defRPr/>
             </a:pPr>
             <a:r>
-              <a:rPr lang="en-US" smtClean="0"/>
-              <a:t>Chapter 1  Introduction</a:t>
-            </a:r>
-            <a:endParaRPr lang="en-US"/>
+              <a:rPr lang="en-US" dirty="0" smtClean="0"/>
+              <a:t>Lecture 1  Introduction</a:t>
+            </a:r>
+            <a:endParaRPr lang="en-US" dirty="0"/>
           </a:p>
         </p:txBody>
       </p:sp>
@@ -11115,10 +11132,10 @@
               <a:defRPr/>
             </a:pPr>
             <a:r>
-              <a:rPr lang="en-US" smtClean="0"/>
-              <a:t>Chapter 1  Introduction</a:t>
-            </a:r>
-            <a:endParaRPr lang="en-US"/>
+              <a:rPr lang="en-US" dirty="0" smtClean="0"/>
+              <a:t>Lecture 1  Introduction</a:t>
+            </a:r>
+            <a:endParaRPr lang="en-US" dirty="0"/>
           </a:p>
         </p:txBody>
       </p:sp>
@@ -11346,10 +11363,10 @@
               <a:defRPr/>
             </a:pPr>
             <a:r>
-              <a:rPr lang="en-US" smtClean="0"/>
-              <a:t>Chapter 1  Introduction</a:t>
-            </a:r>
-            <a:endParaRPr lang="en-US"/>
+              <a:rPr lang="en-US" dirty="0" smtClean="0"/>
+              <a:t>Lecture 1  Introduction</a:t>
+            </a:r>
+            <a:endParaRPr lang="en-US" dirty="0"/>
           </a:p>
         </p:txBody>
       </p:sp>
@@ -11486,10 +11503,10 @@
               <a:defRPr/>
             </a:pPr>
             <a:r>
-              <a:rPr lang="en-US" smtClean="0"/>
-              <a:t>Chapter 1  Introduction</a:t>
-            </a:r>
-            <a:endParaRPr lang="en-US"/>
+              <a:rPr lang="en-US" dirty="0" smtClean="0"/>
+              <a:t>Lecture 1  Introduction</a:t>
+            </a:r>
+            <a:endParaRPr lang="en-US" dirty="0"/>
           </a:p>
         </p:txBody>
       </p:sp>
@@ -11771,10 +11788,10 @@
               <a:defRPr/>
             </a:pPr>
             <a:r>
-              <a:rPr lang="en-US" smtClean="0"/>
-              <a:t>Chapter 1  Introduction</a:t>
-            </a:r>
-            <a:endParaRPr lang="en-US"/>
+              <a:rPr lang="en-US" dirty="0" smtClean="0"/>
+              <a:t>Lecture 1  Introduction</a:t>
+            </a:r>
+            <a:endParaRPr lang="en-US" dirty="0"/>
           </a:p>
         </p:txBody>
       </p:sp>
@@ -11917,10 +11934,10 @@
               <a:defRPr/>
             </a:pPr>
             <a:r>
-              <a:rPr lang="en-US" smtClean="0"/>
-              <a:t>Chapter 1  Introduction</a:t>
-            </a:r>
-            <a:endParaRPr lang="en-US"/>
+              <a:rPr lang="en-US" dirty="0" smtClean="0"/>
+              <a:t>Lecture 1  Introduction</a:t>
+            </a:r>
+            <a:endParaRPr lang="en-US" dirty="0"/>
           </a:p>
         </p:txBody>
       </p:sp>
@@ -12029,10 +12046,10 @@
               <a:defRPr/>
             </a:pPr>
             <a:r>
-              <a:rPr lang="en-US" smtClean="0"/>
-              <a:t>Chapter 1  Introduction</a:t>
-            </a:r>
-            <a:endParaRPr lang="en-US"/>
+              <a:rPr lang="en-US" dirty="0" smtClean="0"/>
+              <a:t>Lecture 1  Introduction</a:t>
+            </a:r>
+            <a:endParaRPr lang="en-US" dirty="0"/>
           </a:p>
         </p:txBody>
       </p:sp>
@@ -12979,10 +12996,10 @@
               <a:defRPr/>
             </a:pPr>
             <a:r>
-              <a:rPr lang="en-US" smtClean="0"/>
-              <a:t>Chapter 1  Introduction</a:t>
-            </a:r>
-            <a:endParaRPr lang="en-US"/>
+              <a:rPr lang="en-US" dirty="0" smtClean="0"/>
+              <a:t>Lecture 1  Introduction</a:t>
+            </a:r>
+            <a:endParaRPr lang="en-US" dirty="0"/>
           </a:p>
         </p:txBody>
       </p:sp>
@@ -13083,10 +13100,10 @@
               <a:defRPr/>
             </a:pPr>
             <a:r>
-              <a:rPr lang="en-US" smtClean="0"/>
-              <a:t>Chapter 1  Introduction</a:t>
-            </a:r>
-            <a:endParaRPr lang="en-US"/>
+              <a:rPr lang="en-US" dirty="0" smtClean="0"/>
+              <a:t>Lecture 1  Introduction</a:t>
+            </a:r>
+            <a:endParaRPr lang="en-US" dirty="0"/>
           </a:p>
         </p:txBody>
       </p:sp>

</xml_diff>